<commit_message>
Fixed typo in presentation, updated PAD with video link
</commit_message>
<xml_diff>
--- a/src/documentation/Presentation.pptx
+++ b/src/documentation/Presentation.pptx
@@ -207,7 +207,7 @@
           <a:p>
             <a:fld id="{7F0A9D36-049F-42D1-A5AC-87A2247FFD14}" type="datetimeFigureOut">
               <a:rPr lang="hu-HU" smtClean="0"/>
-              <a:t>2025. 04. 05.</a:t>
+              <a:t>2025. 04. 06.</a:t>
             </a:fld>
             <a:endParaRPr lang="hu-HU"/>
           </a:p>
@@ -774,7 +774,7 @@
           <a:p>
             <a:fld id="{92724057-8592-4C08-8359-E8FA948C9925}" type="datetimeFigureOut">
               <a:rPr lang="hu-HU" smtClean="0"/>
-              <a:t>2025. 04. 05.</a:t>
+              <a:t>2025. 04. 06.</a:t>
             </a:fld>
             <a:endParaRPr lang="hu-HU"/>
           </a:p>
@@ -944,7 +944,7 @@
           <a:p>
             <a:fld id="{92724057-8592-4C08-8359-E8FA948C9925}" type="datetimeFigureOut">
               <a:rPr lang="hu-HU" smtClean="0"/>
-              <a:t>2025. 04. 05.</a:t>
+              <a:t>2025. 04. 06.</a:t>
             </a:fld>
             <a:endParaRPr lang="hu-HU"/>
           </a:p>
@@ -1124,7 +1124,7 @@
           <a:p>
             <a:fld id="{92724057-8592-4C08-8359-E8FA948C9925}" type="datetimeFigureOut">
               <a:rPr lang="hu-HU" smtClean="0"/>
-              <a:t>2025. 04. 05.</a:t>
+              <a:t>2025. 04. 06.</a:t>
             </a:fld>
             <a:endParaRPr lang="hu-HU"/>
           </a:p>
@@ -1294,7 +1294,7 @@
           <a:p>
             <a:fld id="{92724057-8592-4C08-8359-E8FA948C9925}" type="datetimeFigureOut">
               <a:rPr lang="hu-HU" smtClean="0"/>
-              <a:t>2025. 04. 05.</a:t>
+              <a:t>2025. 04. 06.</a:t>
             </a:fld>
             <a:endParaRPr lang="hu-HU"/>
           </a:p>
@@ -1540,7 +1540,7 @@
           <a:p>
             <a:fld id="{92724057-8592-4C08-8359-E8FA948C9925}" type="datetimeFigureOut">
               <a:rPr lang="hu-HU" smtClean="0"/>
-              <a:t>2025. 04. 05.</a:t>
+              <a:t>2025. 04. 06.</a:t>
             </a:fld>
             <a:endParaRPr lang="hu-HU"/>
           </a:p>
@@ -1772,7 +1772,7 @@
           <a:p>
             <a:fld id="{92724057-8592-4C08-8359-E8FA948C9925}" type="datetimeFigureOut">
               <a:rPr lang="hu-HU" smtClean="0"/>
-              <a:t>2025. 04. 05.</a:t>
+              <a:t>2025. 04. 06.</a:t>
             </a:fld>
             <a:endParaRPr lang="hu-HU"/>
           </a:p>
@@ -2139,7 +2139,7 @@
           <a:p>
             <a:fld id="{92724057-8592-4C08-8359-E8FA948C9925}" type="datetimeFigureOut">
               <a:rPr lang="hu-HU" smtClean="0"/>
-              <a:t>2025. 04. 05.</a:t>
+              <a:t>2025. 04. 06.</a:t>
             </a:fld>
             <a:endParaRPr lang="hu-HU"/>
           </a:p>
@@ -2257,7 +2257,7 @@
           <a:p>
             <a:fld id="{92724057-8592-4C08-8359-E8FA948C9925}" type="datetimeFigureOut">
               <a:rPr lang="hu-HU" smtClean="0"/>
-              <a:t>2025. 04. 05.</a:t>
+              <a:t>2025. 04. 06.</a:t>
             </a:fld>
             <a:endParaRPr lang="hu-HU"/>
           </a:p>
@@ -2352,7 +2352,7 @@
           <a:p>
             <a:fld id="{92724057-8592-4C08-8359-E8FA948C9925}" type="datetimeFigureOut">
               <a:rPr lang="hu-HU" smtClean="0"/>
-              <a:t>2025. 04. 05.</a:t>
+              <a:t>2025. 04. 06.</a:t>
             </a:fld>
             <a:endParaRPr lang="hu-HU"/>
           </a:p>
@@ -2629,7 +2629,7 @@
           <a:p>
             <a:fld id="{92724057-8592-4C08-8359-E8FA948C9925}" type="datetimeFigureOut">
               <a:rPr lang="hu-HU" smtClean="0"/>
-              <a:t>2025. 04. 05.</a:t>
+              <a:t>2025. 04. 06.</a:t>
             </a:fld>
             <a:endParaRPr lang="hu-HU"/>
           </a:p>
@@ -2886,7 +2886,7 @@
           <a:p>
             <a:fld id="{92724057-8592-4C08-8359-E8FA948C9925}" type="datetimeFigureOut">
               <a:rPr lang="hu-HU" smtClean="0"/>
-              <a:t>2025. 04. 05.</a:t>
+              <a:t>2025. 04. 06.</a:t>
             </a:fld>
             <a:endParaRPr lang="hu-HU"/>
           </a:p>
@@ -3108,7 +3108,7 @@
           <a:p>
             <a:fld id="{92724057-8592-4C08-8359-E8FA948C9925}" type="datetimeFigureOut">
               <a:rPr lang="hu-HU" smtClean="0"/>
-              <a:t>2025. 04. 05.</a:t>
+              <a:t>2025. 04. 06.</a:t>
             </a:fld>
             <a:endParaRPr lang="hu-HU"/>
           </a:p>
@@ -9437,7 +9437,7 @@
         <p:spPr>
           <a:xfrm>
             <a:off x="209168" y="3526393"/>
-            <a:ext cx="3250311" cy="861774"/>
+            <a:ext cx="3455689" cy="861774"/>
           </a:xfrm>
           <a:prstGeom prst="rect">
             <a:avLst/>
@@ -9457,17 +9457,32 @@
                 </a:solidFill>
                 <a:latin typeface="Figtree" pitchFamily="2" charset="0"/>
               </a:rPr>
-              <a:t>A labirintusnak van megoldása</a:t>
+              <a:t>A labirintusnak </a:t>
             </a:r>
             <a:r>
-              <a:rPr lang="hu-HU" dirty="0">
+              <a:rPr lang="hu-HU" sz="1600">
                 <a:solidFill>
                   <a:schemeClr val="bg1"/>
                 </a:solidFill>
                 <a:latin typeface="Figtree" pitchFamily="2" charset="0"/>
               </a:rPr>
-              <a:t>	:</a:t>
+              <a:t>nincs megoldása</a:t>
             </a:r>
+            <a:r>
+              <a:rPr lang="hu-HU">
+                <a:solidFill>
+                  <a:schemeClr val="bg1"/>
+                </a:solidFill>
+                <a:latin typeface="Figtree" pitchFamily="2" charset="0"/>
+              </a:rPr>
+              <a:t>:</a:t>
+            </a:r>
+            <a:endParaRPr lang="hu-HU" dirty="0">
+              <a:solidFill>
+                <a:schemeClr val="bg1"/>
+              </a:solidFill>
+              <a:latin typeface="Figtree" pitchFamily="2" charset="0"/>
+            </a:endParaRPr>
           </a:p>
           <a:p>
             <a:endParaRPr lang="hu-HU" dirty="0">
@@ -10515,8 +10530,8 @@
           </a:p>
         </p:txBody>
       </p:sp>
-      <mc:AlternateContent xmlns:mc="http://schemas.openxmlformats.org/markup-compatibility/2006">
-        <mc:Choice xmlns:a14="http://schemas.microsoft.com/office/drawing/2010/main" Requires="a14">
+      <mc:AlternateContent xmlns:mc="http://schemas.openxmlformats.org/markup-compatibility/2006" xmlns:a14="http://schemas.microsoft.com/office/drawing/2010/main">
+        <mc:Choice Requires="a14">
           <p:sp>
             <p:nvSpPr>
               <p:cNvPr id="5" name="TextBox 4">
@@ -10617,7 +10632,7 @@
             </p:txBody>
           </p:sp>
         </mc:Choice>
-        <mc:Fallback>
+        <mc:Fallback xmlns="">
           <p:sp>
             <p:nvSpPr>
               <p:cNvPr id="5" name="TextBox 4">

</xml_diff>